<commit_message>
Screen Change - Filter
</commit_message>
<xml_diff>
--- a/ScreensAndVariables.pptx
+++ b/ScreensAndVariables.pptx
@@ -300,7 +300,7 @@
           <a:p>
             <a:fld id="{C39AE962-E632-4B08-9C68-8D946479B504}" type="datetimeFigureOut">
               <a:rPr lang="en-US" smtClean="0"/>
-              <a:t>11/11/2021</a:t>
+              <a:t>11/13/2021</a:t>
             </a:fld>
             <a:endParaRPr lang="en-US" dirty="0"/>
           </a:p>
@@ -498,7 +498,7 @@
           <a:p>
             <a:fld id="{C39AE962-E632-4B08-9C68-8D946479B504}" type="datetimeFigureOut">
               <a:rPr lang="en-US" smtClean="0"/>
-              <a:t>11/11/2021</a:t>
+              <a:t>11/13/2021</a:t>
             </a:fld>
             <a:endParaRPr lang="en-US" dirty="0"/>
           </a:p>
@@ -706,7 +706,7 @@
           <a:p>
             <a:fld id="{C39AE962-E632-4B08-9C68-8D946479B504}" type="datetimeFigureOut">
               <a:rPr lang="en-US" smtClean="0"/>
-              <a:t>11/11/2021</a:t>
+              <a:t>11/13/2021</a:t>
             </a:fld>
             <a:endParaRPr lang="en-US" dirty="0"/>
           </a:p>
@@ -904,7 +904,7 @@
           <a:p>
             <a:fld id="{C39AE962-E632-4B08-9C68-8D946479B504}" type="datetimeFigureOut">
               <a:rPr lang="en-US" smtClean="0"/>
-              <a:t>11/11/2021</a:t>
+              <a:t>11/13/2021</a:t>
             </a:fld>
             <a:endParaRPr lang="en-US" dirty="0"/>
           </a:p>
@@ -1179,7 +1179,7 @@
           <a:p>
             <a:fld id="{C39AE962-E632-4B08-9C68-8D946479B504}" type="datetimeFigureOut">
               <a:rPr lang="en-US" smtClean="0"/>
-              <a:t>11/11/2021</a:t>
+              <a:t>11/13/2021</a:t>
             </a:fld>
             <a:endParaRPr lang="en-US" dirty="0"/>
           </a:p>
@@ -1444,7 +1444,7 @@
           <a:p>
             <a:fld id="{C39AE962-E632-4B08-9C68-8D946479B504}" type="datetimeFigureOut">
               <a:rPr lang="en-US" smtClean="0"/>
-              <a:t>11/11/2021</a:t>
+              <a:t>11/13/2021</a:t>
             </a:fld>
             <a:endParaRPr lang="en-US" dirty="0"/>
           </a:p>
@@ -1856,7 +1856,7 @@
           <a:p>
             <a:fld id="{C39AE962-E632-4B08-9C68-8D946479B504}" type="datetimeFigureOut">
               <a:rPr lang="en-US" smtClean="0"/>
-              <a:t>11/11/2021</a:t>
+              <a:t>11/13/2021</a:t>
             </a:fld>
             <a:endParaRPr lang="en-US" dirty="0"/>
           </a:p>
@@ -1997,7 +1997,7 @@
           <a:p>
             <a:fld id="{C39AE962-E632-4B08-9C68-8D946479B504}" type="datetimeFigureOut">
               <a:rPr lang="en-US" smtClean="0"/>
-              <a:t>11/11/2021</a:t>
+              <a:t>11/13/2021</a:t>
             </a:fld>
             <a:endParaRPr lang="en-US" dirty="0"/>
           </a:p>
@@ -2110,7 +2110,7 @@
           <a:p>
             <a:fld id="{C39AE962-E632-4B08-9C68-8D946479B504}" type="datetimeFigureOut">
               <a:rPr lang="en-US" smtClean="0"/>
-              <a:t>11/11/2021</a:t>
+              <a:t>11/13/2021</a:t>
             </a:fld>
             <a:endParaRPr lang="en-US" dirty="0"/>
           </a:p>
@@ -2421,7 +2421,7 @@
           <a:p>
             <a:fld id="{C39AE962-E632-4B08-9C68-8D946479B504}" type="datetimeFigureOut">
               <a:rPr lang="en-US" smtClean="0"/>
-              <a:t>11/11/2021</a:t>
+              <a:t>11/13/2021</a:t>
             </a:fld>
             <a:endParaRPr lang="en-US" dirty="0"/>
           </a:p>
@@ -2709,7 +2709,7 @@
           <a:p>
             <a:fld id="{C39AE962-E632-4B08-9C68-8D946479B504}" type="datetimeFigureOut">
               <a:rPr lang="en-US" smtClean="0"/>
-              <a:t>11/11/2021</a:t>
+              <a:t>11/13/2021</a:t>
             </a:fld>
             <a:endParaRPr lang="en-US" dirty="0"/>
           </a:p>
@@ -2950,7 +2950,7 @@
           <a:p>
             <a:fld id="{C39AE962-E632-4B08-9C68-8D946479B504}" type="datetimeFigureOut">
               <a:rPr lang="en-US" smtClean="0"/>
-              <a:t>11/11/2021</a:t>
+              <a:t>11/13/2021</a:t>
             </a:fld>
             <a:endParaRPr lang="en-US" dirty="0"/>
           </a:p>
@@ -22215,7 +22215,7 @@
         <p:spPr>
           <a:xfrm>
             <a:off x="110827" y="2334491"/>
-            <a:ext cx="5948215" cy="1477328"/>
+            <a:ext cx="5948215" cy="1754326"/>
           </a:xfrm>
           <a:prstGeom prst="rect">
             <a:avLst/>
@@ -22239,14 +22239,22 @@
             </a:r>
             <a:r>
               <a:rPr lang="en-US" dirty="0"/>
-              <a:t>=1; MenuLevel2 =! 0;</a:t>
-            </a:r>
-          </a:p>
-          <a:p>
+              <a:t>=1; </a:t>
+            </a:r>
+            <a:r>
+              <a:rPr lang="en-US"/>
+              <a:t>	menuLevel3=1;</a:t>
+            </a:r>
             <a:endParaRPr lang="en-US" dirty="0"/>
           </a:p>
           <a:p>
             <a:r>
+              <a:rPr lang="en-US" dirty="0"/>
+              <a:t>MenuLevel2 =! 0;</a:t>
+            </a:r>
+          </a:p>
+          <a:p>
+            <a:r>
               <a:rPr lang="en-US" noProof="1"/>
               <a:t>MenuSelectionOption =2;</a:t>
             </a:r>
@@ -22267,6 +22275,9 @@
               <a:rPr lang="en-US" dirty="0"/>
               <a:t> =0;</a:t>
             </a:r>
+          </a:p>
+          <a:p>
+            <a:endParaRPr lang="en-US" dirty="0"/>
           </a:p>
         </p:txBody>
       </p:sp>

</xml_diff>